<commit_message>
modificados privlegios de usuarios
</commit_message>
<xml_diff>
--- a/Documentacion/Presentacion.pptx
+++ b/Documentacion/Presentacion.pptx
@@ -12,10 +12,10 @@
     <p:sldId id="258" r:id="rId3"/>
     <p:sldId id="257" r:id="rId4"/>
     <p:sldId id="259" r:id="rId5"/>
-    <p:sldId id="261" r:id="rId6"/>
-    <p:sldId id="260" r:id="rId7"/>
-    <p:sldId id="262" r:id="rId8"/>
-    <p:sldId id="269" r:id="rId9"/>
+    <p:sldId id="260" r:id="rId6"/>
+    <p:sldId id="261" r:id="rId7"/>
+    <p:sldId id="269" r:id="rId8"/>
+    <p:sldId id="262" r:id="rId9"/>
     <p:sldId id="263" r:id="rId10"/>
     <p:sldId id="264" r:id="rId11"/>
     <p:sldId id="270" r:id="rId12"/>
@@ -135,10 +135,10 @@
             <p14:sldId id="258"/>
             <p14:sldId id="257"/>
             <p14:sldId id="259"/>
+            <p14:sldId id="260"/>
             <p14:sldId id="261"/>
-            <p14:sldId id="260"/>
+            <p14:sldId id="269"/>
             <p14:sldId id="262"/>
-            <p14:sldId id="269"/>
             <p14:sldId id="263"/>
             <p14:sldId id="264"/>
             <p14:sldId id="270"/>
@@ -6331,7 +6331,7 @@
         <p:spPr>
           <a:xfrm>
             <a:off x="4547498" y="5973550"/>
-            <a:ext cx="2433423" cy="369332"/>
+            <a:ext cx="2792752" cy="369332"/>
           </a:xfrm>
           <a:prstGeom prst="rect">
             <a:avLst/>
@@ -6346,7 +6346,7 @@
           <a:p>
             <a:r>
               <a:rPr lang="es-ES" dirty="0"/>
-              <a:t>NAVEGADOR DE AVISOS</a:t>
+              <a:t>NAVEGADOR DE REGISTROS</a:t>
             </a:r>
           </a:p>
         </p:txBody>
@@ -9785,7 +9785,7 @@
             <a:pPr algn="ctr"/>
             <a:r>
               <a:rPr lang="es-ES" sz="3200" dirty="0"/>
-              <a:t>       ACCESO A LA APLICACION</a:t>
+              <a:t>      INTERFAZ DE USUARIO</a:t>
             </a:r>
           </a:p>
         </p:txBody>
@@ -9826,12 +9826,92 @@
           </a:prstGeom>
         </p:spPr>
       </p:pic>
+      <p:sp>
+        <p:nvSpPr>
+          <p:cNvPr id="2" name="CuadroTexto 1">
+            <a:extLst>
+              <a:ext uri="{FF2B5EF4-FFF2-40B4-BE49-F238E27FC236}">
+                <a16:creationId xmlns:a16="http://schemas.microsoft.com/office/drawing/2014/main" id="{C6B56246-29F2-1D19-E0B5-C7FB9325B57E}"/>
+              </a:ext>
+            </a:extLst>
+          </p:cNvPr>
+          <p:cNvSpPr txBox="1"/>
+          <p:nvPr/>
+        </p:nvSpPr>
+        <p:spPr>
+          <a:xfrm>
+            <a:off x="1171576" y="2066925"/>
+            <a:ext cx="4610100" cy="923330"/>
+          </a:xfrm>
+          <a:prstGeom prst="rect">
+            <a:avLst/>
+          </a:prstGeom>
+          <a:noFill/>
+        </p:spPr>
+        <p:txBody>
+          <a:bodyPr wrap="square" rtlCol="0">
+            <a:spAutoFit/>
+          </a:bodyPr>
+          <a:lstStyle/>
+          <a:p>
+            <a:pPr algn="ctr"/>
+            <a:r>
+              <a:rPr lang="es-ES" dirty="0"/>
+              <a:t>PRINCIPALMENTE DISEÑADA PARA USO EN LA VERSION DE ESCRITORIO CON TODA LA FUNCIONALIDAD</a:t>
+            </a:r>
+          </a:p>
+        </p:txBody>
+      </p:sp>
+      <p:sp>
+        <p:nvSpPr>
+          <p:cNvPr id="12" name="CuadroTexto 11">
+            <a:extLst>
+              <a:ext uri="{FF2B5EF4-FFF2-40B4-BE49-F238E27FC236}">
+                <a16:creationId xmlns:a16="http://schemas.microsoft.com/office/drawing/2014/main" id="{27967AC3-6C60-EB58-07B2-F81121A87DA2}"/>
+              </a:ext>
+            </a:extLst>
+          </p:cNvPr>
+          <p:cNvSpPr txBox="1"/>
+          <p:nvPr/>
+        </p:nvSpPr>
+        <p:spPr>
+          <a:xfrm>
+            <a:off x="6715126" y="2066925"/>
+            <a:ext cx="4610100" cy="923330"/>
+          </a:xfrm>
+          <a:prstGeom prst="rect">
+            <a:avLst/>
+          </a:prstGeom>
+          <a:noFill/>
+        </p:spPr>
+        <p:txBody>
+          <a:bodyPr wrap="square" rtlCol="0">
+            <a:spAutoFit/>
+          </a:bodyPr>
+          <a:lstStyle/>
+          <a:p>
+            <a:pPr algn="ctr"/>
+            <a:r>
+              <a:rPr lang="es-ES" dirty="0"/>
+              <a:t>VERSION PARA PANTALLAS MAS REDUCIDAS CON ANCHO MÁXIMO DE 600 </a:t>
+            </a:r>
+            <a:r>
+              <a:rPr lang="es-ES" dirty="0" err="1"/>
+              <a:t>px</a:t>
+            </a:r>
+            <a:r>
+              <a:rPr lang="es-ES" dirty="0"/>
+              <a:t> Y FUNCIONALIDAD BÁSICA</a:t>
+            </a:r>
+          </a:p>
+        </p:txBody>
+      </p:sp>
       <p:pic>
         <p:nvPicPr>
-          <p:cNvPr id="3" name="Imagen 2">
-            <a:extLst>
-              <a:ext uri="{FF2B5EF4-FFF2-40B4-BE49-F238E27FC236}">
-                <a16:creationId xmlns:a16="http://schemas.microsoft.com/office/drawing/2014/main" id="{51B75E54-D175-3C5E-63B0-050FD1D1741E}"/>
+          <p:cNvPr id="15" name="Imagen 14">
+            <a:extLst>
+              <a:ext uri="{FF2B5EF4-FFF2-40B4-BE49-F238E27FC236}">
+                <a16:creationId xmlns:a16="http://schemas.microsoft.com/office/drawing/2014/main" id="{E6AD08CE-21E8-A9E1-54AE-4EF5FF40004A}"/>
               </a:ext>
             </a:extLst>
           </p:cNvPr>
@@ -9840,15 +9920,16 @@
           </p:cNvPicPr>
           <p:nvPr/>
         </p:nvPicPr>
-        <p:blipFill rotWithShape="1">
+        <p:blipFill>
           <a:blip r:embed="rId3"/>
-          <a:srcRect l="7194" t="4545" r="8764" b="7379"/>
-          <a:stretch/>
+          <a:stretch>
+            <a:fillRect/>
+          </a:stretch>
         </p:blipFill>
         <p:spPr>
           <a:xfrm>
-            <a:off x="1476375" y="2381250"/>
-            <a:ext cx="3714750" cy="2505075"/>
+            <a:off x="7980636" y="3018831"/>
+            <a:ext cx="2534964" cy="3381872"/>
           </a:xfrm>
           <a:prstGeom prst="rect">
             <a:avLst/>
@@ -9864,10 +9945,10 @@
       </p:pic>
       <p:pic>
         <p:nvPicPr>
-          <p:cNvPr id="5" name="Imagen 4">
-            <a:extLst>
-              <a:ext uri="{FF2B5EF4-FFF2-40B4-BE49-F238E27FC236}">
-                <a16:creationId xmlns:a16="http://schemas.microsoft.com/office/drawing/2014/main" id="{F586B4AA-CE21-5674-D227-A263189FC741}"/>
+          <p:cNvPr id="17" name="Imagen 16">
+            <a:extLst>
+              <a:ext uri="{FF2B5EF4-FFF2-40B4-BE49-F238E27FC236}">
+                <a16:creationId xmlns:a16="http://schemas.microsoft.com/office/drawing/2014/main" id="{3D259EE6-DC86-8F40-0C39-DC4ADCBE5ACA}"/>
               </a:ext>
             </a:extLst>
           </p:cNvPr>
@@ -9884,8 +9965,8 @@
         </p:blipFill>
         <p:spPr>
           <a:xfrm>
-            <a:off x="7241191" y="2381250"/>
-            <a:ext cx="3396044" cy="2505075"/>
+            <a:off x="1087164" y="3057064"/>
+            <a:ext cx="5256486" cy="3315063"/>
           </a:xfrm>
           <a:prstGeom prst="rect">
             <a:avLst/>
@@ -9899,82 +9980,10 @@
           </a:effectLst>
         </p:spPr>
       </p:pic>
-      <p:sp>
-        <p:nvSpPr>
-          <p:cNvPr id="8" name="CuadroTexto 7">
-            <a:extLst>
-              <a:ext uri="{FF2B5EF4-FFF2-40B4-BE49-F238E27FC236}">
-                <a16:creationId xmlns:a16="http://schemas.microsoft.com/office/drawing/2014/main" id="{63743862-F602-75B8-474E-DF50ADE9832A}"/>
-              </a:ext>
-            </a:extLst>
-          </p:cNvPr>
-          <p:cNvSpPr txBox="1"/>
-          <p:nvPr/>
-        </p:nvSpPr>
-        <p:spPr>
-          <a:xfrm>
-            <a:off x="1304926" y="5372100"/>
-            <a:ext cx="3971924" cy="646331"/>
-          </a:xfrm>
-          <a:prstGeom prst="rect">
-            <a:avLst/>
-          </a:prstGeom>
-          <a:noFill/>
-        </p:spPr>
-        <p:txBody>
-          <a:bodyPr wrap="square" rtlCol="0">
-            <a:spAutoFit/>
-          </a:bodyPr>
-          <a:lstStyle/>
-          <a:p>
-            <a:pPr algn="ctr"/>
-            <a:r>
-              <a:rPr lang="es-ES" dirty="0"/>
-              <a:t>Formulario de LOGIN para acceso de usuarios registrados</a:t>
-            </a:r>
-          </a:p>
-        </p:txBody>
-      </p:sp>
-      <p:sp>
-        <p:nvSpPr>
-          <p:cNvPr id="9" name="CuadroTexto 8">
-            <a:extLst>
-              <a:ext uri="{FF2B5EF4-FFF2-40B4-BE49-F238E27FC236}">
-                <a16:creationId xmlns:a16="http://schemas.microsoft.com/office/drawing/2014/main" id="{91B1E732-29B7-50B6-3776-A8732FCC771B}"/>
-              </a:ext>
-            </a:extLst>
-          </p:cNvPr>
-          <p:cNvSpPr txBox="1"/>
-          <p:nvPr/>
-        </p:nvSpPr>
-        <p:spPr>
-          <a:xfrm>
-            <a:off x="6953251" y="5372100"/>
-            <a:ext cx="3971924" cy="646331"/>
-          </a:xfrm>
-          <a:prstGeom prst="rect">
-            <a:avLst/>
-          </a:prstGeom>
-          <a:noFill/>
-        </p:spPr>
-        <p:txBody>
-          <a:bodyPr wrap="square" rtlCol="0">
-            <a:spAutoFit/>
-          </a:bodyPr>
-          <a:lstStyle/>
-          <a:p>
-            <a:pPr algn="ctr"/>
-            <a:r>
-              <a:rPr lang="es-ES" dirty="0"/>
-              <a:t>Formulario de REGISTRO para nuevos usuarios.</a:t>
-            </a:r>
-          </a:p>
-        </p:txBody>
-      </p:sp>
     </p:spTree>
     <p:extLst>
       <p:ext uri="{BB962C8B-B14F-4D97-AF65-F5344CB8AC3E}">
-        <p14:creationId xmlns:p14="http://schemas.microsoft.com/office/powerpoint/2010/main" val="1489890151"/>
+        <p14:creationId xmlns:p14="http://schemas.microsoft.com/office/powerpoint/2010/main" val="2735370648"/>
       </p:ext>
     </p:extLst>
   </p:cSld>
@@ -10063,7 +10072,7 @@
             <a:pPr algn="ctr"/>
             <a:r>
               <a:rPr lang="es-ES" sz="3200" dirty="0"/>
-              <a:t>      INTERFAZ DE USUARIO</a:t>
+              <a:t>       ACCESO A LA APLICACION</a:t>
             </a:r>
           </a:p>
         </p:txBody>
@@ -10104,84 +10113,12 @@
           </a:prstGeom>
         </p:spPr>
       </p:pic>
-      <p:sp>
-        <p:nvSpPr>
-          <p:cNvPr id="2" name="CuadroTexto 1">
-            <a:extLst>
-              <a:ext uri="{FF2B5EF4-FFF2-40B4-BE49-F238E27FC236}">
-                <a16:creationId xmlns:a16="http://schemas.microsoft.com/office/drawing/2014/main" id="{C6B56246-29F2-1D19-E0B5-C7FB9325B57E}"/>
-              </a:ext>
-            </a:extLst>
-          </p:cNvPr>
-          <p:cNvSpPr txBox="1"/>
-          <p:nvPr/>
-        </p:nvSpPr>
-        <p:spPr>
-          <a:xfrm>
-            <a:off x="1171576" y="2066925"/>
-            <a:ext cx="4610100" cy="923330"/>
-          </a:xfrm>
-          <a:prstGeom prst="rect">
-            <a:avLst/>
-          </a:prstGeom>
-          <a:noFill/>
-        </p:spPr>
-        <p:txBody>
-          <a:bodyPr wrap="square" rtlCol="0">
-            <a:spAutoFit/>
-          </a:bodyPr>
-          <a:lstStyle/>
-          <a:p>
-            <a:pPr algn="ctr"/>
-            <a:r>
-              <a:rPr lang="es-ES" dirty="0"/>
-              <a:t>PRINCIPALMENTE DISEÑADA PARA USO EN LA VERSION DE ESCRITORIO CON TODA LA FUNCIONALIDAD</a:t>
-            </a:r>
-          </a:p>
-        </p:txBody>
-      </p:sp>
-      <p:sp>
-        <p:nvSpPr>
-          <p:cNvPr id="12" name="CuadroTexto 11">
-            <a:extLst>
-              <a:ext uri="{FF2B5EF4-FFF2-40B4-BE49-F238E27FC236}">
-                <a16:creationId xmlns:a16="http://schemas.microsoft.com/office/drawing/2014/main" id="{27967AC3-6C60-EB58-07B2-F81121A87DA2}"/>
-              </a:ext>
-            </a:extLst>
-          </p:cNvPr>
-          <p:cNvSpPr txBox="1"/>
-          <p:nvPr/>
-        </p:nvSpPr>
-        <p:spPr>
-          <a:xfrm>
-            <a:off x="6715126" y="2066925"/>
-            <a:ext cx="4610100" cy="646331"/>
-          </a:xfrm>
-          <a:prstGeom prst="rect">
-            <a:avLst/>
-          </a:prstGeom>
-          <a:noFill/>
-        </p:spPr>
-        <p:txBody>
-          <a:bodyPr wrap="square" rtlCol="0">
-            <a:spAutoFit/>
-          </a:bodyPr>
-          <a:lstStyle/>
-          <a:p>
-            <a:pPr algn="ctr"/>
-            <a:r>
-              <a:rPr lang="es-ES" dirty="0"/>
-              <a:t>VERSION PARA PANTALLAS MAS REDUCIDAS CON FUNCIONALIDAD BÁSICA</a:t>
-            </a:r>
-          </a:p>
-        </p:txBody>
-      </p:sp>
       <p:pic>
         <p:nvPicPr>
-          <p:cNvPr id="15" name="Imagen 14">
-            <a:extLst>
-              <a:ext uri="{FF2B5EF4-FFF2-40B4-BE49-F238E27FC236}">
-                <a16:creationId xmlns:a16="http://schemas.microsoft.com/office/drawing/2014/main" id="{E6AD08CE-21E8-A9E1-54AE-4EF5FF40004A}"/>
+          <p:cNvPr id="3" name="Imagen 2">
+            <a:extLst>
+              <a:ext uri="{FF2B5EF4-FFF2-40B4-BE49-F238E27FC236}">
+                <a16:creationId xmlns:a16="http://schemas.microsoft.com/office/drawing/2014/main" id="{51B75E54-D175-3C5E-63B0-050FD1D1741E}"/>
               </a:ext>
             </a:extLst>
           </p:cNvPr>
@@ -10190,16 +10127,15 @@
           </p:cNvPicPr>
           <p:nvPr/>
         </p:nvPicPr>
-        <p:blipFill>
+        <p:blipFill rotWithShape="1">
           <a:blip r:embed="rId3"/>
-          <a:stretch>
-            <a:fillRect/>
-          </a:stretch>
+          <a:srcRect l="7194" t="4545" r="8764" b="7379"/>
+          <a:stretch/>
         </p:blipFill>
         <p:spPr>
           <a:xfrm>
-            <a:off x="7980636" y="3018831"/>
-            <a:ext cx="2534964" cy="3381872"/>
+            <a:off x="1476375" y="2381250"/>
+            <a:ext cx="3714750" cy="2505075"/>
           </a:xfrm>
           <a:prstGeom prst="rect">
             <a:avLst/>
@@ -10215,10 +10151,10 @@
       </p:pic>
       <p:pic>
         <p:nvPicPr>
-          <p:cNvPr id="17" name="Imagen 16">
-            <a:extLst>
-              <a:ext uri="{FF2B5EF4-FFF2-40B4-BE49-F238E27FC236}">
-                <a16:creationId xmlns:a16="http://schemas.microsoft.com/office/drawing/2014/main" id="{3D259EE6-DC86-8F40-0C39-DC4ADCBE5ACA}"/>
+          <p:cNvPr id="5" name="Imagen 4">
+            <a:extLst>
+              <a:ext uri="{FF2B5EF4-FFF2-40B4-BE49-F238E27FC236}">
+                <a16:creationId xmlns:a16="http://schemas.microsoft.com/office/drawing/2014/main" id="{F586B4AA-CE21-5674-D227-A263189FC741}"/>
               </a:ext>
             </a:extLst>
           </p:cNvPr>
@@ -10235,8 +10171,8 @@
         </p:blipFill>
         <p:spPr>
           <a:xfrm>
-            <a:off x="1087164" y="3057064"/>
-            <a:ext cx="5256486" cy="3315063"/>
+            <a:off x="7241191" y="2381250"/>
+            <a:ext cx="3396044" cy="2505075"/>
           </a:xfrm>
           <a:prstGeom prst="rect">
             <a:avLst/>
@@ -10250,10 +10186,82 @@
           </a:effectLst>
         </p:spPr>
       </p:pic>
+      <p:sp>
+        <p:nvSpPr>
+          <p:cNvPr id="8" name="CuadroTexto 7">
+            <a:extLst>
+              <a:ext uri="{FF2B5EF4-FFF2-40B4-BE49-F238E27FC236}">
+                <a16:creationId xmlns:a16="http://schemas.microsoft.com/office/drawing/2014/main" id="{63743862-F602-75B8-474E-DF50ADE9832A}"/>
+              </a:ext>
+            </a:extLst>
+          </p:cNvPr>
+          <p:cNvSpPr txBox="1"/>
+          <p:nvPr/>
+        </p:nvSpPr>
+        <p:spPr>
+          <a:xfrm>
+            <a:off x="1304926" y="5372100"/>
+            <a:ext cx="3971924" cy="646331"/>
+          </a:xfrm>
+          <a:prstGeom prst="rect">
+            <a:avLst/>
+          </a:prstGeom>
+          <a:noFill/>
+        </p:spPr>
+        <p:txBody>
+          <a:bodyPr wrap="square" rtlCol="0">
+            <a:spAutoFit/>
+          </a:bodyPr>
+          <a:lstStyle/>
+          <a:p>
+            <a:pPr algn="ctr"/>
+            <a:r>
+              <a:rPr lang="es-ES" dirty="0"/>
+              <a:t>Formulario de LOGIN para acceso de usuarios registrados</a:t>
+            </a:r>
+          </a:p>
+        </p:txBody>
+      </p:sp>
+      <p:sp>
+        <p:nvSpPr>
+          <p:cNvPr id="9" name="CuadroTexto 8">
+            <a:extLst>
+              <a:ext uri="{FF2B5EF4-FFF2-40B4-BE49-F238E27FC236}">
+                <a16:creationId xmlns:a16="http://schemas.microsoft.com/office/drawing/2014/main" id="{91B1E732-29B7-50B6-3776-A8732FCC771B}"/>
+              </a:ext>
+            </a:extLst>
+          </p:cNvPr>
+          <p:cNvSpPr txBox="1"/>
+          <p:nvPr/>
+        </p:nvSpPr>
+        <p:spPr>
+          <a:xfrm>
+            <a:off x="6953251" y="5372100"/>
+            <a:ext cx="3971924" cy="646331"/>
+          </a:xfrm>
+          <a:prstGeom prst="rect">
+            <a:avLst/>
+          </a:prstGeom>
+          <a:noFill/>
+        </p:spPr>
+        <p:txBody>
+          <a:bodyPr wrap="square" rtlCol="0">
+            <a:spAutoFit/>
+          </a:bodyPr>
+          <a:lstStyle/>
+          <a:p>
+            <a:pPr algn="ctr"/>
+            <a:r>
+              <a:rPr lang="es-ES" dirty="0"/>
+              <a:t>Formulario de REGISTRO para nuevos usuarios.</a:t>
+            </a:r>
+          </a:p>
+        </p:txBody>
+      </p:sp>
     </p:spTree>
     <p:extLst>
       <p:ext uri="{BB962C8B-B14F-4D97-AF65-F5344CB8AC3E}">
-        <p14:creationId xmlns:p14="http://schemas.microsoft.com/office/powerpoint/2010/main" val="2735370648"/>
+        <p14:creationId xmlns:p14="http://schemas.microsoft.com/office/powerpoint/2010/main" val="1489890151"/>
       </p:ext>
     </p:extLst>
   </p:cSld>
@@ -10280,36 +10288,6 @@
           <a:chExt cx="0" cy="0"/>
         </a:xfrm>
       </p:grpSpPr>
-      <p:pic>
-        <p:nvPicPr>
-          <p:cNvPr id="22" name="Imagen 21">
-            <a:extLst>
-              <a:ext uri="{FF2B5EF4-FFF2-40B4-BE49-F238E27FC236}">
-                <a16:creationId xmlns:a16="http://schemas.microsoft.com/office/drawing/2014/main" id="{A352E3CD-37B4-0068-586D-E738B1D1E444}"/>
-              </a:ext>
-            </a:extLst>
-          </p:cNvPr>
-          <p:cNvPicPr>
-            <a:picLocks noChangeAspect="1"/>
-          </p:cNvPicPr>
-          <p:nvPr/>
-        </p:nvPicPr>
-        <p:blipFill>
-          <a:blip r:embed="rId2"/>
-          <a:stretch>
-            <a:fillRect/>
-          </a:stretch>
-        </p:blipFill>
-        <p:spPr>
-          <a:xfrm>
-            <a:off x="771525" y="1729584"/>
-            <a:ext cx="10534650" cy="1121045"/>
-          </a:xfrm>
-          <a:prstGeom prst="rect">
-            <a:avLst/>
-          </a:prstGeom>
-        </p:spPr>
-      </p:pic>
       <p:sp>
         <p:nvSpPr>
           <p:cNvPr id="6" name="Rectángulo 5">
@@ -10338,8 +10316,8 @@
           <a:ln>
             <a:solidFill>
               <a:schemeClr val="tx1">
-                <a:lumMod val="75000"/>
-                <a:lumOff val="25000"/>
+                <a:lumMod val="65000"/>
+                <a:lumOff val="35000"/>
               </a:schemeClr>
             </a:solidFill>
           </a:ln>
@@ -10372,7 +10350,7 @@
             <a:pPr algn="ctr"/>
             <a:r>
               <a:rPr lang="es-ES" sz="3200" dirty="0"/>
-              <a:t>          BARRA DE NAVEGACION</a:t>
+              <a:t>      PAGINA PRINCIPAL</a:t>
             </a:r>
           </a:p>
         </p:txBody>
@@ -10392,7 +10370,7 @@
           <p:nvPr/>
         </p:nvPicPr>
         <p:blipFill>
-          <a:blip r:embed="rId3">
+          <a:blip r:embed="rId2">
             <a:extLst>
               <a:ext uri="{28A0092B-C50C-407E-A947-70E740481C1C}">
                 <a14:useLocalDpi xmlns:a14="http://schemas.microsoft.com/office/drawing/2010/main" val="0"/>
@@ -10415,172 +10393,10 @@
       </p:pic>
       <p:sp>
         <p:nvSpPr>
-          <p:cNvPr id="8" name="Flecha: a la derecha 7">
-            <a:extLst>
-              <a:ext uri="{FF2B5EF4-FFF2-40B4-BE49-F238E27FC236}">
-                <a16:creationId xmlns:a16="http://schemas.microsoft.com/office/drawing/2014/main" id="{C5BADF22-DCB1-A396-A673-7B3CB7E9D122}"/>
-              </a:ext>
-            </a:extLst>
-          </p:cNvPr>
-          <p:cNvSpPr/>
-          <p:nvPr/>
-        </p:nvSpPr>
-        <p:spPr>
-          <a:xfrm rot="13992477">
-            <a:off x="1871374" y="3035098"/>
-            <a:ext cx="700197" cy="328036"/>
-          </a:xfrm>
-          <a:prstGeom prst="rightArrow">
-            <a:avLst/>
-          </a:prstGeom>
-          <a:solidFill>
-            <a:srgbClr val="A00020"/>
-          </a:solidFill>
-          <a:ln>
-            <a:solidFill>
-              <a:srgbClr val="A00020"/>
-            </a:solidFill>
-          </a:ln>
-        </p:spPr>
-        <p:style>
-          <a:lnRef idx="2">
-            <a:schemeClr val="accent1">
-              <a:shade val="50000"/>
-            </a:schemeClr>
-          </a:lnRef>
-          <a:fillRef idx="1">
-            <a:schemeClr val="accent1"/>
-          </a:fillRef>
-          <a:effectRef idx="0">
-            <a:schemeClr val="accent1"/>
-          </a:effectRef>
-          <a:fontRef idx="minor">
-            <a:schemeClr val="lt1"/>
-          </a:fontRef>
-        </p:style>
-        <p:txBody>
-          <a:bodyPr rtlCol="0" anchor="ctr"/>
-          <a:lstStyle/>
-          <a:p>
-            <a:pPr algn="ctr"/>
-            <a:endParaRPr lang="es-ES" dirty="0"/>
-          </a:p>
-        </p:txBody>
-      </p:sp>
-      <p:sp>
-        <p:nvSpPr>
-          <p:cNvPr id="10" name="Flecha: a la derecha 9">
-            <a:extLst>
-              <a:ext uri="{FF2B5EF4-FFF2-40B4-BE49-F238E27FC236}">
-                <a16:creationId xmlns:a16="http://schemas.microsoft.com/office/drawing/2014/main" id="{044DDE04-2701-5F28-44F7-93FBB95075B7}"/>
-              </a:ext>
-            </a:extLst>
-          </p:cNvPr>
-          <p:cNvSpPr/>
-          <p:nvPr/>
-        </p:nvSpPr>
-        <p:spPr>
-          <a:xfrm rot="14664616">
-            <a:off x="9408472" y="3129032"/>
-            <a:ext cx="1859208" cy="296534"/>
-          </a:xfrm>
-          <a:prstGeom prst="rightArrow">
-            <a:avLst/>
-          </a:prstGeom>
-          <a:solidFill>
-            <a:srgbClr val="A00020"/>
-          </a:solidFill>
-          <a:ln>
-            <a:solidFill>
-              <a:srgbClr val="A00020"/>
-            </a:solidFill>
-          </a:ln>
-        </p:spPr>
-        <p:style>
-          <a:lnRef idx="2">
-            <a:schemeClr val="accent1">
-              <a:shade val="50000"/>
-            </a:schemeClr>
-          </a:lnRef>
-          <a:fillRef idx="1">
-            <a:schemeClr val="accent1"/>
-          </a:fillRef>
-          <a:effectRef idx="0">
-            <a:schemeClr val="accent1"/>
-          </a:effectRef>
-          <a:fontRef idx="minor">
-            <a:schemeClr val="lt1"/>
-          </a:fontRef>
-        </p:style>
-        <p:txBody>
-          <a:bodyPr rtlCol="0" anchor="ctr"/>
-          <a:lstStyle/>
-          <a:p>
-            <a:pPr algn="ctr"/>
-            <a:endParaRPr lang="es-ES"/>
-          </a:p>
-        </p:txBody>
-      </p:sp>
-      <p:sp>
-        <p:nvSpPr>
-          <p:cNvPr id="11" name="Flecha: a la derecha 10">
-            <a:extLst>
-              <a:ext uri="{FF2B5EF4-FFF2-40B4-BE49-F238E27FC236}">
-                <a16:creationId xmlns:a16="http://schemas.microsoft.com/office/drawing/2014/main" id="{FE36C777-26BA-4939-3E8D-5B1EFA46149F}"/>
-              </a:ext>
-            </a:extLst>
-          </p:cNvPr>
-          <p:cNvSpPr/>
-          <p:nvPr/>
-        </p:nvSpPr>
-        <p:spPr>
-          <a:xfrm rot="12351602">
-            <a:off x="4833051" y="3068839"/>
-            <a:ext cx="1859208" cy="309187"/>
-          </a:xfrm>
-          <a:prstGeom prst="rightArrow">
-            <a:avLst/>
-          </a:prstGeom>
-          <a:solidFill>
-            <a:srgbClr val="A00020"/>
-          </a:solidFill>
-          <a:ln>
-            <a:solidFill>
-              <a:srgbClr val="A00020"/>
-            </a:solidFill>
-          </a:ln>
-        </p:spPr>
-        <p:style>
-          <a:lnRef idx="2">
-            <a:schemeClr val="accent1">
-              <a:shade val="50000"/>
-            </a:schemeClr>
-          </a:lnRef>
-          <a:fillRef idx="1">
-            <a:schemeClr val="accent1"/>
-          </a:fillRef>
-          <a:effectRef idx="0">
-            <a:schemeClr val="accent1"/>
-          </a:effectRef>
-          <a:fontRef idx="minor">
-            <a:schemeClr val="lt1"/>
-          </a:fontRef>
-        </p:style>
-        <p:txBody>
-          <a:bodyPr rtlCol="0" anchor="ctr"/>
-          <a:lstStyle/>
-          <a:p>
-            <a:pPr algn="ctr"/>
-            <a:endParaRPr lang="es-ES" dirty="0"/>
-          </a:p>
-        </p:txBody>
-      </p:sp>
-      <p:sp>
-        <p:nvSpPr>
-          <p:cNvPr id="12" name="CuadroTexto 11">
-            <a:extLst>
-              <a:ext uri="{FF2B5EF4-FFF2-40B4-BE49-F238E27FC236}">
-                <a16:creationId xmlns:a16="http://schemas.microsoft.com/office/drawing/2014/main" id="{9076D800-02B3-5AAB-D1DE-798B29072D5B}"/>
+          <p:cNvPr id="2" name="CuadroTexto 1">
+            <a:extLst>
+              <a:ext uri="{FF2B5EF4-FFF2-40B4-BE49-F238E27FC236}">
+                <a16:creationId xmlns:a16="http://schemas.microsoft.com/office/drawing/2014/main" id="{C6B56246-29F2-1D19-E0B5-C7FB9325B57E}"/>
               </a:ext>
             </a:extLst>
           </p:cNvPr>
@@ -10589,8 +10405,8 @@
         </p:nvSpPr>
         <p:spPr>
           <a:xfrm>
-            <a:off x="1677960" y="3557196"/>
-            <a:ext cx="2516715" cy="369332"/>
+            <a:off x="1416050" y="6117193"/>
+            <a:ext cx="9020176" cy="369332"/>
           </a:xfrm>
           <a:prstGeom prst="rect">
             <a:avLst/>
@@ -10598,183 +10414,25 @@
           <a:noFill/>
         </p:spPr>
         <p:txBody>
-          <a:bodyPr wrap="none" rtlCol="0">
+          <a:bodyPr wrap="square" rtlCol="0">
             <a:spAutoFit/>
           </a:bodyPr>
           <a:lstStyle/>
           <a:p>
+            <a:pPr algn="ctr"/>
             <a:r>
               <a:rPr lang="es-ES" dirty="0"/>
-              <a:t>LOGO DE LA APLICACIÓN</a:t>
-            </a:r>
-          </a:p>
-        </p:txBody>
-      </p:sp>
-      <p:sp>
-        <p:nvSpPr>
-          <p:cNvPr id="13" name="CuadroTexto 12">
-            <a:extLst>
-              <a:ext uri="{FF2B5EF4-FFF2-40B4-BE49-F238E27FC236}">
-                <a16:creationId xmlns:a16="http://schemas.microsoft.com/office/drawing/2014/main" id="{C9DDED05-662F-0C1D-22BD-1E190263328B}"/>
-              </a:ext>
-            </a:extLst>
-          </p:cNvPr>
-          <p:cNvSpPr txBox="1"/>
-          <p:nvPr/>
-        </p:nvSpPr>
-        <p:spPr>
-          <a:xfrm>
-            <a:off x="6148388" y="3697911"/>
-            <a:ext cx="2457148" cy="369332"/>
-          </a:xfrm>
-          <a:prstGeom prst="rect">
-            <a:avLst/>
-          </a:prstGeom>
-          <a:noFill/>
-        </p:spPr>
-        <p:txBody>
-          <a:bodyPr wrap="none" rtlCol="0">
-            <a:spAutoFit/>
-          </a:bodyPr>
-          <a:lstStyle/>
-          <a:p>
-            <a:r>
-              <a:rPr lang="es-ES" dirty="0"/>
-              <a:t>BARRA DE NAVEGACIÓN</a:t>
-            </a:r>
-          </a:p>
-        </p:txBody>
-      </p:sp>
-      <p:sp>
-        <p:nvSpPr>
-          <p:cNvPr id="14" name="CuadroTexto 13">
-            <a:extLst>
-              <a:ext uri="{FF2B5EF4-FFF2-40B4-BE49-F238E27FC236}">
-                <a16:creationId xmlns:a16="http://schemas.microsoft.com/office/drawing/2014/main" id="{EFC23E86-51B1-3475-9C57-14F3790B117F}"/>
-              </a:ext>
-            </a:extLst>
-          </p:cNvPr>
-          <p:cNvSpPr txBox="1"/>
-          <p:nvPr/>
-        </p:nvSpPr>
-        <p:spPr>
-          <a:xfrm>
-            <a:off x="9697011" y="4226616"/>
-            <a:ext cx="2015039" cy="369332"/>
-          </a:xfrm>
-          <a:prstGeom prst="rect">
-            <a:avLst/>
-          </a:prstGeom>
-          <a:noFill/>
-        </p:spPr>
-        <p:txBody>
-          <a:bodyPr wrap="none" rtlCol="0">
-            <a:spAutoFit/>
-          </a:bodyPr>
-          <a:lstStyle/>
-          <a:p>
-            <a:r>
-              <a:rPr lang="es-ES" dirty="0"/>
-              <a:t>MENU DE USUARIO</a:t>
-            </a:r>
-          </a:p>
-        </p:txBody>
-      </p:sp>
-      <p:sp>
-        <p:nvSpPr>
-          <p:cNvPr id="17" name="Flecha: a la derecha 16">
-            <a:extLst>
-              <a:ext uri="{FF2B5EF4-FFF2-40B4-BE49-F238E27FC236}">
-                <a16:creationId xmlns:a16="http://schemas.microsoft.com/office/drawing/2014/main" id="{7C3BA53A-E27E-ACBC-995C-AC8ECF36139B}"/>
-              </a:ext>
-            </a:extLst>
-          </p:cNvPr>
-          <p:cNvSpPr/>
-          <p:nvPr/>
-        </p:nvSpPr>
-        <p:spPr>
-          <a:xfrm>
-            <a:off x="5109246" y="5483907"/>
-            <a:ext cx="1859208" cy="296534"/>
-          </a:xfrm>
-          <a:prstGeom prst="rightArrow">
-            <a:avLst/>
-          </a:prstGeom>
-          <a:solidFill>
-            <a:srgbClr val="A00020"/>
-          </a:solidFill>
-          <a:ln>
-            <a:solidFill>
-              <a:srgbClr val="A00020"/>
-            </a:solidFill>
-          </a:ln>
-        </p:spPr>
-        <p:style>
-          <a:lnRef idx="2">
-            <a:schemeClr val="accent1">
-              <a:shade val="50000"/>
-            </a:schemeClr>
-          </a:lnRef>
-          <a:fillRef idx="1">
-            <a:schemeClr val="accent1"/>
-          </a:fillRef>
-          <a:effectRef idx="0">
-            <a:schemeClr val="accent1"/>
-          </a:effectRef>
-          <a:fontRef idx="minor">
-            <a:schemeClr val="lt1"/>
-          </a:fontRef>
-        </p:style>
-        <p:txBody>
-          <a:bodyPr rtlCol="0" anchor="ctr"/>
-          <a:lstStyle/>
-          <a:p>
-            <a:pPr algn="ctr"/>
-            <a:endParaRPr lang="es-ES"/>
-          </a:p>
-        </p:txBody>
-      </p:sp>
-      <p:sp>
-        <p:nvSpPr>
-          <p:cNvPr id="18" name="CuadroTexto 17">
-            <a:extLst>
-              <a:ext uri="{FF2B5EF4-FFF2-40B4-BE49-F238E27FC236}">
-                <a16:creationId xmlns:a16="http://schemas.microsoft.com/office/drawing/2014/main" id="{9FF4C8D7-D00B-9296-5BE2-7932830BD149}"/>
-              </a:ext>
-            </a:extLst>
-          </p:cNvPr>
-          <p:cNvSpPr txBox="1"/>
-          <p:nvPr/>
-        </p:nvSpPr>
-        <p:spPr>
-          <a:xfrm>
-            <a:off x="1460404" y="5544144"/>
-            <a:ext cx="3442674" cy="369332"/>
-          </a:xfrm>
-          <a:prstGeom prst="rect">
-            <a:avLst/>
-          </a:prstGeom>
-          <a:noFill/>
-        </p:spPr>
-        <p:txBody>
-          <a:bodyPr wrap="none" rtlCol="0">
-            <a:spAutoFit/>
-          </a:bodyPr>
-          <a:lstStyle/>
-          <a:p>
-            <a:r>
-              <a:rPr lang="es-ES" dirty="0"/>
-              <a:t>OPCIONES DEL MENU DE USUARIO</a:t>
+              <a:t>INFORMACION RELEVANTE PARA EL USUARIO (POSIBLE MEJORA ELECCION DE ESTADISTICAS)</a:t>
             </a:r>
           </a:p>
         </p:txBody>
       </p:sp>
       <p:pic>
         <p:nvPicPr>
-          <p:cNvPr id="24" name="Imagen 23">
-            <a:extLst>
-              <a:ext uri="{FF2B5EF4-FFF2-40B4-BE49-F238E27FC236}">
-                <a16:creationId xmlns:a16="http://schemas.microsoft.com/office/drawing/2014/main" id="{8C1B24FD-E9F5-C51E-C78F-2695C0D8965E}"/>
+          <p:cNvPr id="3" name="Imagen 2">
+            <a:extLst>
+              <a:ext uri="{FF2B5EF4-FFF2-40B4-BE49-F238E27FC236}">
+                <a16:creationId xmlns:a16="http://schemas.microsoft.com/office/drawing/2014/main" id="{A9416560-CCF3-A838-1218-F91EC72F6784}"/>
               </a:ext>
             </a:extLst>
           </p:cNvPr>
@@ -10783,15 +10441,16 @@
           </p:cNvPicPr>
           <p:nvPr/>
         </p:nvPicPr>
-        <p:blipFill rotWithShape="1">
-          <a:blip r:embed="rId4"/>
-          <a:srcRect l="14125" t="-3364" r="-17433" b="-20238"/>
-          <a:stretch/>
+        <p:blipFill>
+          <a:blip r:embed="rId3"/>
+          <a:stretch>
+            <a:fillRect/>
+          </a:stretch>
         </p:blipFill>
         <p:spPr>
           <a:xfrm>
-            <a:off x="7231995" y="4380835"/>
-            <a:ext cx="2627559" cy="2695951"/>
+            <a:off x="2713508" y="1770702"/>
+            <a:ext cx="6425260" cy="4052164"/>
           </a:xfrm>
           <a:prstGeom prst="rect">
             <a:avLst/>
@@ -10808,7 +10467,7 @@
     </p:spTree>
     <p:extLst>
       <p:ext uri="{BB962C8B-B14F-4D97-AF65-F5344CB8AC3E}">
-        <p14:creationId xmlns:p14="http://schemas.microsoft.com/office/powerpoint/2010/main" val="1400079440"/>
+        <p14:creationId xmlns:p14="http://schemas.microsoft.com/office/powerpoint/2010/main" val="2103573387"/>
       </p:ext>
     </p:extLst>
   </p:cSld>
@@ -10835,6 +10494,36 @@
           <a:chExt cx="0" cy="0"/>
         </a:xfrm>
       </p:grpSpPr>
+      <p:pic>
+        <p:nvPicPr>
+          <p:cNvPr id="22" name="Imagen 21">
+            <a:extLst>
+              <a:ext uri="{FF2B5EF4-FFF2-40B4-BE49-F238E27FC236}">
+                <a16:creationId xmlns:a16="http://schemas.microsoft.com/office/drawing/2014/main" id="{A352E3CD-37B4-0068-586D-E738B1D1E444}"/>
+              </a:ext>
+            </a:extLst>
+          </p:cNvPr>
+          <p:cNvPicPr>
+            <a:picLocks noChangeAspect="1"/>
+          </p:cNvPicPr>
+          <p:nvPr/>
+        </p:nvPicPr>
+        <p:blipFill>
+          <a:blip r:embed="rId2"/>
+          <a:stretch>
+            <a:fillRect/>
+          </a:stretch>
+        </p:blipFill>
+        <p:spPr>
+          <a:xfrm>
+            <a:off x="771525" y="1729584"/>
+            <a:ext cx="10534650" cy="1121045"/>
+          </a:xfrm>
+          <a:prstGeom prst="rect">
+            <a:avLst/>
+          </a:prstGeom>
+        </p:spPr>
+      </p:pic>
       <p:sp>
         <p:nvSpPr>
           <p:cNvPr id="6" name="Rectángulo 5">
@@ -10863,8 +10552,8 @@
           <a:ln>
             <a:solidFill>
               <a:schemeClr val="tx1">
-                <a:lumMod val="65000"/>
-                <a:lumOff val="35000"/>
+                <a:lumMod val="75000"/>
+                <a:lumOff val="25000"/>
               </a:schemeClr>
             </a:solidFill>
           </a:ln>
@@ -10897,7 +10586,7 @@
             <a:pPr algn="ctr"/>
             <a:r>
               <a:rPr lang="es-ES" sz="3200" dirty="0"/>
-              <a:t>      PAGINA PRINCIPAL</a:t>
+              <a:t>          BARRA DE NAVEGACION</a:t>
             </a:r>
           </a:p>
         </p:txBody>
@@ -10917,7 +10606,7 @@
           <p:nvPr/>
         </p:nvPicPr>
         <p:blipFill>
-          <a:blip r:embed="rId2">
+          <a:blip r:embed="rId3">
             <a:extLst>
               <a:ext uri="{28A0092B-C50C-407E-A947-70E740481C1C}">
                 <a14:useLocalDpi xmlns:a14="http://schemas.microsoft.com/office/drawing/2010/main" val="0"/>
@@ -10940,10 +10629,172 @@
       </p:pic>
       <p:sp>
         <p:nvSpPr>
-          <p:cNvPr id="2" name="CuadroTexto 1">
-            <a:extLst>
-              <a:ext uri="{FF2B5EF4-FFF2-40B4-BE49-F238E27FC236}">
-                <a16:creationId xmlns:a16="http://schemas.microsoft.com/office/drawing/2014/main" id="{C6B56246-29F2-1D19-E0B5-C7FB9325B57E}"/>
+          <p:cNvPr id="8" name="Flecha: a la derecha 7">
+            <a:extLst>
+              <a:ext uri="{FF2B5EF4-FFF2-40B4-BE49-F238E27FC236}">
+                <a16:creationId xmlns:a16="http://schemas.microsoft.com/office/drawing/2014/main" id="{C5BADF22-DCB1-A396-A673-7B3CB7E9D122}"/>
+              </a:ext>
+            </a:extLst>
+          </p:cNvPr>
+          <p:cNvSpPr/>
+          <p:nvPr/>
+        </p:nvSpPr>
+        <p:spPr>
+          <a:xfrm rot="13992477">
+            <a:off x="1871374" y="3035098"/>
+            <a:ext cx="700197" cy="328036"/>
+          </a:xfrm>
+          <a:prstGeom prst="rightArrow">
+            <a:avLst/>
+          </a:prstGeom>
+          <a:solidFill>
+            <a:srgbClr val="A00020"/>
+          </a:solidFill>
+          <a:ln>
+            <a:solidFill>
+              <a:srgbClr val="A00020"/>
+            </a:solidFill>
+          </a:ln>
+        </p:spPr>
+        <p:style>
+          <a:lnRef idx="2">
+            <a:schemeClr val="accent1">
+              <a:shade val="50000"/>
+            </a:schemeClr>
+          </a:lnRef>
+          <a:fillRef idx="1">
+            <a:schemeClr val="accent1"/>
+          </a:fillRef>
+          <a:effectRef idx="0">
+            <a:schemeClr val="accent1"/>
+          </a:effectRef>
+          <a:fontRef idx="minor">
+            <a:schemeClr val="lt1"/>
+          </a:fontRef>
+        </p:style>
+        <p:txBody>
+          <a:bodyPr rtlCol="0" anchor="ctr"/>
+          <a:lstStyle/>
+          <a:p>
+            <a:pPr algn="ctr"/>
+            <a:endParaRPr lang="es-ES" dirty="0"/>
+          </a:p>
+        </p:txBody>
+      </p:sp>
+      <p:sp>
+        <p:nvSpPr>
+          <p:cNvPr id="10" name="Flecha: a la derecha 9">
+            <a:extLst>
+              <a:ext uri="{FF2B5EF4-FFF2-40B4-BE49-F238E27FC236}">
+                <a16:creationId xmlns:a16="http://schemas.microsoft.com/office/drawing/2014/main" id="{044DDE04-2701-5F28-44F7-93FBB95075B7}"/>
+              </a:ext>
+            </a:extLst>
+          </p:cNvPr>
+          <p:cNvSpPr/>
+          <p:nvPr/>
+        </p:nvSpPr>
+        <p:spPr>
+          <a:xfrm rot="14664616">
+            <a:off x="9408472" y="3129032"/>
+            <a:ext cx="1859208" cy="296534"/>
+          </a:xfrm>
+          <a:prstGeom prst="rightArrow">
+            <a:avLst/>
+          </a:prstGeom>
+          <a:solidFill>
+            <a:srgbClr val="A00020"/>
+          </a:solidFill>
+          <a:ln>
+            <a:solidFill>
+              <a:srgbClr val="A00020"/>
+            </a:solidFill>
+          </a:ln>
+        </p:spPr>
+        <p:style>
+          <a:lnRef idx="2">
+            <a:schemeClr val="accent1">
+              <a:shade val="50000"/>
+            </a:schemeClr>
+          </a:lnRef>
+          <a:fillRef idx="1">
+            <a:schemeClr val="accent1"/>
+          </a:fillRef>
+          <a:effectRef idx="0">
+            <a:schemeClr val="accent1"/>
+          </a:effectRef>
+          <a:fontRef idx="minor">
+            <a:schemeClr val="lt1"/>
+          </a:fontRef>
+        </p:style>
+        <p:txBody>
+          <a:bodyPr rtlCol="0" anchor="ctr"/>
+          <a:lstStyle/>
+          <a:p>
+            <a:pPr algn="ctr"/>
+            <a:endParaRPr lang="es-ES"/>
+          </a:p>
+        </p:txBody>
+      </p:sp>
+      <p:sp>
+        <p:nvSpPr>
+          <p:cNvPr id="11" name="Flecha: a la derecha 10">
+            <a:extLst>
+              <a:ext uri="{FF2B5EF4-FFF2-40B4-BE49-F238E27FC236}">
+                <a16:creationId xmlns:a16="http://schemas.microsoft.com/office/drawing/2014/main" id="{FE36C777-26BA-4939-3E8D-5B1EFA46149F}"/>
+              </a:ext>
+            </a:extLst>
+          </p:cNvPr>
+          <p:cNvSpPr/>
+          <p:nvPr/>
+        </p:nvSpPr>
+        <p:spPr>
+          <a:xfrm rot="12351602">
+            <a:off x="4833051" y="3068839"/>
+            <a:ext cx="1859208" cy="309187"/>
+          </a:xfrm>
+          <a:prstGeom prst="rightArrow">
+            <a:avLst/>
+          </a:prstGeom>
+          <a:solidFill>
+            <a:srgbClr val="A00020"/>
+          </a:solidFill>
+          <a:ln>
+            <a:solidFill>
+              <a:srgbClr val="A00020"/>
+            </a:solidFill>
+          </a:ln>
+        </p:spPr>
+        <p:style>
+          <a:lnRef idx="2">
+            <a:schemeClr val="accent1">
+              <a:shade val="50000"/>
+            </a:schemeClr>
+          </a:lnRef>
+          <a:fillRef idx="1">
+            <a:schemeClr val="accent1"/>
+          </a:fillRef>
+          <a:effectRef idx="0">
+            <a:schemeClr val="accent1"/>
+          </a:effectRef>
+          <a:fontRef idx="minor">
+            <a:schemeClr val="lt1"/>
+          </a:fontRef>
+        </p:style>
+        <p:txBody>
+          <a:bodyPr rtlCol="0" anchor="ctr"/>
+          <a:lstStyle/>
+          <a:p>
+            <a:pPr algn="ctr"/>
+            <a:endParaRPr lang="es-ES" dirty="0"/>
+          </a:p>
+        </p:txBody>
+      </p:sp>
+      <p:sp>
+        <p:nvSpPr>
+          <p:cNvPr id="12" name="CuadroTexto 11">
+            <a:extLst>
+              <a:ext uri="{FF2B5EF4-FFF2-40B4-BE49-F238E27FC236}">
+                <a16:creationId xmlns:a16="http://schemas.microsoft.com/office/drawing/2014/main" id="{9076D800-02B3-5AAB-D1DE-798B29072D5B}"/>
               </a:ext>
             </a:extLst>
           </p:cNvPr>
@@ -10952,8 +10803,8 @@
         </p:nvSpPr>
         <p:spPr>
           <a:xfrm>
-            <a:off x="1416050" y="6117193"/>
-            <a:ext cx="9020176" cy="369332"/>
+            <a:off x="1677960" y="3557196"/>
+            <a:ext cx="2516715" cy="369332"/>
           </a:xfrm>
           <a:prstGeom prst="rect">
             <a:avLst/>
@@ -10961,25 +10812,183 @@
           <a:noFill/>
         </p:spPr>
         <p:txBody>
-          <a:bodyPr wrap="square" rtlCol="0">
+          <a:bodyPr wrap="none" rtlCol="0">
             <a:spAutoFit/>
           </a:bodyPr>
           <a:lstStyle/>
           <a:p>
+            <a:r>
+              <a:rPr lang="es-ES" dirty="0"/>
+              <a:t>LOGO DE LA APLICACIÓN</a:t>
+            </a:r>
+          </a:p>
+        </p:txBody>
+      </p:sp>
+      <p:sp>
+        <p:nvSpPr>
+          <p:cNvPr id="13" name="CuadroTexto 12">
+            <a:extLst>
+              <a:ext uri="{FF2B5EF4-FFF2-40B4-BE49-F238E27FC236}">
+                <a16:creationId xmlns:a16="http://schemas.microsoft.com/office/drawing/2014/main" id="{C9DDED05-662F-0C1D-22BD-1E190263328B}"/>
+              </a:ext>
+            </a:extLst>
+          </p:cNvPr>
+          <p:cNvSpPr txBox="1"/>
+          <p:nvPr/>
+        </p:nvSpPr>
+        <p:spPr>
+          <a:xfrm>
+            <a:off x="6148388" y="3697911"/>
+            <a:ext cx="2457148" cy="369332"/>
+          </a:xfrm>
+          <a:prstGeom prst="rect">
+            <a:avLst/>
+          </a:prstGeom>
+          <a:noFill/>
+        </p:spPr>
+        <p:txBody>
+          <a:bodyPr wrap="none" rtlCol="0">
+            <a:spAutoFit/>
+          </a:bodyPr>
+          <a:lstStyle/>
+          <a:p>
+            <a:r>
+              <a:rPr lang="es-ES" dirty="0"/>
+              <a:t>BARRA DE NAVEGACIÓN</a:t>
+            </a:r>
+          </a:p>
+        </p:txBody>
+      </p:sp>
+      <p:sp>
+        <p:nvSpPr>
+          <p:cNvPr id="14" name="CuadroTexto 13">
+            <a:extLst>
+              <a:ext uri="{FF2B5EF4-FFF2-40B4-BE49-F238E27FC236}">
+                <a16:creationId xmlns:a16="http://schemas.microsoft.com/office/drawing/2014/main" id="{EFC23E86-51B1-3475-9C57-14F3790B117F}"/>
+              </a:ext>
+            </a:extLst>
+          </p:cNvPr>
+          <p:cNvSpPr txBox="1"/>
+          <p:nvPr/>
+        </p:nvSpPr>
+        <p:spPr>
+          <a:xfrm>
+            <a:off x="9697011" y="4226616"/>
+            <a:ext cx="2015039" cy="369332"/>
+          </a:xfrm>
+          <a:prstGeom prst="rect">
+            <a:avLst/>
+          </a:prstGeom>
+          <a:noFill/>
+        </p:spPr>
+        <p:txBody>
+          <a:bodyPr wrap="none" rtlCol="0">
+            <a:spAutoFit/>
+          </a:bodyPr>
+          <a:lstStyle/>
+          <a:p>
+            <a:r>
+              <a:rPr lang="es-ES" dirty="0"/>
+              <a:t>MENU DE USUARIO</a:t>
+            </a:r>
+          </a:p>
+        </p:txBody>
+      </p:sp>
+      <p:sp>
+        <p:nvSpPr>
+          <p:cNvPr id="17" name="Flecha: a la derecha 16">
+            <a:extLst>
+              <a:ext uri="{FF2B5EF4-FFF2-40B4-BE49-F238E27FC236}">
+                <a16:creationId xmlns:a16="http://schemas.microsoft.com/office/drawing/2014/main" id="{7C3BA53A-E27E-ACBC-995C-AC8ECF36139B}"/>
+              </a:ext>
+            </a:extLst>
+          </p:cNvPr>
+          <p:cNvSpPr/>
+          <p:nvPr/>
+        </p:nvSpPr>
+        <p:spPr>
+          <a:xfrm>
+            <a:off x="5109246" y="5483907"/>
+            <a:ext cx="1859208" cy="296534"/>
+          </a:xfrm>
+          <a:prstGeom prst="rightArrow">
+            <a:avLst/>
+          </a:prstGeom>
+          <a:solidFill>
+            <a:srgbClr val="A00020"/>
+          </a:solidFill>
+          <a:ln>
+            <a:solidFill>
+              <a:srgbClr val="A00020"/>
+            </a:solidFill>
+          </a:ln>
+        </p:spPr>
+        <p:style>
+          <a:lnRef idx="2">
+            <a:schemeClr val="accent1">
+              <a:shade val="50000"/>
+            </a:schemeClr>
+          </a:lnRef>
+          <a:fillRef idx="1">
+            <a:schemeClr val="accent1"/>
+          </a:fillRef>
+          <a:effectRef idx="0">
+            <a:schemeClr val="accent1"/>
+          </a:effectRef>
+          <a:fontRef idx="minor">
+            <a:schemeClr val="lt1"/>
+          </a:fontRef>
+        </p:style>
+        <p:txBody>
+          <a:bodyPr rtlCol="0" anchor="ctr"/>
+          <a:lstStyle/>
+          <a:p>
             <a:pPr algn="ctr"/>
+            <a:endParaRPr lang="es-ES"/>
+          </a:p>
+        </p:txBody>
+      </p:sp>
+      <p:sp>
+        <p:nvSpPr>
+          <p:cNvPr id="18" name="CuadroTexto 17">
+            <a:extLst>
+              <a:ext uri="{FF2B5EF4-FFF2-40B4-BE49-F238E27FC236}">
+                <a16:creationId xmlns:a16="http://schemas.microsoft.com/office/drawing/2014/main" id="{9FF4C8D7-D00B-9296-5BE2-7932830BD149}"/>
+              </a:ext>
+            </a:extLst>
+          </p:cNvPr>
+          <p:cNvSpPr txBox="1"/>
+          <p:nvPr/>
+        </p:nvSpPr>
+        <p:spPr>
+          <a:xfrm>
+            <a:off x="1460404" y="5544144"/>
+            <a:ext cx="3442674" cy="369332"/>
+          </a:xfrm>
+          <a:prstGeom prst="rect">
+            <a:avLst/>
+          </a:prstGeom>
+          <a:noFill/>
+        </p:spPr>
+        <p:txBody>
+          <a:bodyPr wrap="none" rtlCol="0">
+            <a:spAutoFit/>
+          </a:bodyPr>
+          <a:lstStyle/>
+          <a:p>
             <a:r>
               <a:rPr lang="es-ES" dirty="0"/>
-              <a:t>INFORMACION RELEVANTE PARA EL USUARIO (POSIBLE MEJORA ELECCION DE ESTADISTICAS)</a:t>
+              <a:t>OPCIONES DEL MENU DE USUARIO</a:t>
             </a:r>
           </a:p>
         </p:txBody>
       </p:sp>
       <p:pic>
         <p:nvPicPr>
-          <p:cNvPr id="3" name="Imagen 2">
-            <a:extLst>
-              <a:ext uri="{FF2B5EF4-FFF2-40B4-BE49-F238E27FC236}">
-                <a16:creationId xmlns:a16="http://schemas.microsoft.com/office/drawing/2014/main" id="{A9416560-CCF3-A838-1218-F91EC72F6784}"/>
+          <p:cNvPr id="24" name="Imagen 23">
+            <a:extLst>
+              <a:ext uri="{FF2B5EF4-FFF2-40B4-BE49-F238E27FC236}">
+                <a16:creationId xmlns:a16="http://schemas.microsoft.com/office/drawing/2014/main" id="{8C1B24FD-E9F5-C51E-C78F-2695C0D8965E}"/>
               </a:ext>
             </a:extLst>
           </p:cNvPr>
@@ -10988,16 +10997,15 @@
           </p:cNvPicPr>
           <p:nvPr/>
         </p:nvPicPr>
-        <p:blipFill>
-          <a:blip r:embed="rId3"/>
-          <a:stretch>
-            <a:fillRect/>
-          </a:stretch>
+        <p:blipFill rotWithShape="1">
+          <a:blip r:embed="rId4"/>
+          <a:srcRect l="14125" t="-3364" r="-17433" b="-20238"/>
+          <a:stretch/>
         </p:blipFill>
         <p:spPr>
           <a:xfrm>
-            <a:off x="2713508" y="1770702"/>
-            <a:ext cx="6425260" cy="4052164"/>
+            <a:off x="7231995" y="4380835"/>
+            <a:ext cx="2627559" cy="2695951"/>
           </a:xfrm>
           <a:prstGeom prst="rect">
             <a:avLst/>
@@ -11014,7 +11022,7 @@
     </p:spTree>
     <p:extLst>
       <p:ext uri="{BB962C8B-B14F-4D97-AF65-F5344CB8AC3E}">
-        <p14:creationId xmlns:p14="http://schemas.microsoft.com/office/powerpoint/2010/main" val="2103573387"/>
+        <p14:creationId xmlns:p14="http://schemas.microsoft.com/office/powerpoint/2010/main" val="1400079440"/>
       </p:ext>
     </p:extLst>
   </p:cSld>

</xml_diff>